<commit_message>
rename hello to parabola
</commit_message>
<xml_diff>
--- a/FlowChart.pptx
+++ b/FlowChart.pptx
@@ -104,6 +104,11 @@
       </a:defRPr>
     </a:lvl9pPr>
   </p:defaultTextStyle>
+  <p:extLst>
+    <p:ext uri="{EFAFB233-063F-42B5-8137-9DF3F51BA10A}">
+      <p15:sldGuideLst xmlns:p15="http://schemas.microsoft.com/office/powerpoint/2012/main"/>
+    </p:ext>
+  </p:extLst>
 </p:presentation>
 </file>
 
@@ -3440,20 +3445,12 @@
           <a:p>
             <a:pPr algn="ctr"/>
             <a:r>
-              <a:rPr kumimoji="1" lang="en-US" altLang="ko-KR" dirty="0" err="1">
-                <a:solidFill>
-                  <a:schemeClr val="tx1"/>
-                </a:solidFill>
-              </a:rPr>
-              <a:t>Initalize</a:t>
-            </a:r>
-            <a:r>
               <a:rPr kumimoji="1" lang="en-US" altLang="ko-KR" dirty="0">
                 <a:solidFill>
                   <a:schemeClr val="tx1"/>
                 </a:solidFill>
               </a:rPr>
-              <a:t> screen and character</a:t>
+              <a:t>Initialize screen and character</a:t>
             </a:r>
             <a:endParaRPr kumimoji="1" lang="ko-KR" altLang="en-US" dirty="0">
               <a:solidFill>

</xml_diff>

<commit_message>
add Basic main.c code
</commit_message>
<xml_diff>
--- a/FlowChart.pptx
+++ b/FlowChart.pptx
@@ -6,6 +6,9 @@
   </p:sldMasterIdLst>
   <p:sldIdLst>
     <p:sldId id="256" r:id="rId2"/>
+    <p:sldId id="259" r:id="rId3"/>
+    <p:sldId id="257" r:id="rId4"/>
+    <p:sldId id="260" r:id="rId5"/>
   </p:sldIdLst>
   <p:sldSz cx="12192000" cy="6858000"/>
   <p:notesSz cx="6858000" cy="9144000"/>
@@ -259,7 +262,7 @@
           <a:p>
             <a:fld id="{043022E0-5E5F-6244-A182-8DD32E0DF443}" type="datetimeFigureOut">
               <a:rPr kumimoji="1" lang="ko-KR" altLang="en-US" smtClean="0"/>
-              <a:t>2018. 5. 10.</a:t>
+              <a:t>2018. 5. 11.</a:t>
             </a:fld>
             <a:endParaRPr kumimoji="1" lang="ko-KR" altLang="en-US"/>
           </a:p>
@@ -457,7 +460,7 @@
           <a:p>
             <a:fld id="{043022E0-5E5F-6244-A182-8DD32E0DF443}" type="datetimeFigureOut">
               <a:rPr kumimoji="1" lang="ko-KR" altLang="en-US" smtClean="0"/>
-              <a:t>2018. 5. 10.</a:t>
+              <a:t>2018. 5. 11.</a:t>
             </a:fld>
             <a:endParaRPr kumimoji="1" lang="ko-KR" altLang="en-US"/>
           </a:p>
@@ -665,7 +668,7 @@
           <a:p>
             <a:fld id="{043022E0-5E5F-6244-A182-8DD32E0DF443}" type="datetimeFigureOut">
               <a:rPr kumimoji="1" lang="ko-KR" altLang="en-US" smtClean="0"/>
-              <a:t>2018. 5. 10.</a:t>
+              <a:t>2018. 5. 11.</a:t>
             </a:fld>
             <a:endParaRPr kumimoji="1" lang="ko-KR" altLang="en-US"/>
           </a:p>
@@ -863,7 +866,7 @@
           <a:p>
             <a:fld id="{043022E0-5E5F-6244-A182-8DD32E0DF443}" type="datetimeFigureOut">
               <a:rPr kumimoji="1" lang="ko-KR" altLang="en-US" smtClean="0"/>
-              <a:t>2018. 5. 10.</a:t>
+              <a:t>2018. 5. 11.</a:t>
             </a:fld>
             <a:endParaRPr kumimoji="1" lang="ko-KR" altLang="en-US"/>
           </a:p>
@@ -1138,7 +1141,7 @@
           <a:p>
             <a:fld id="{043022E0-5E5F-6244-A182-8DD32E0DF443}" type="datetimeFigureOut">
               <a:rPr kumimoji="1" lang="ko-KR" altLang="en-US" smtClean="0"/>
-              <a:t>2018. 5. 10.</a:t>
+              <a:t>2018. 5. 11.</a:t>
             </a:fld>
             <a:endParaRPr kumimoji="1" lang="ko-KR" altLang="en-US"/>
           </a:p>
@@ -1403,7 +1406,7 @@
           <a:p>
             <a:fld id="{043022E0-5E5F-6244-A182-8DD32E0DF443}" type="datetimeFigureOut">
               <a:rPr kumimoji="1" lang="ko-KR" altLang="en-US" smtClean="0"/>
-              <a:t>2018. 5. 10.</a:t>
+              <a:t>2018. 5. 11.</a:t>
             </a:fld>
             <a:endParaRPr kumimoji="1" lang="ko-KR" altLang="en-US"/>
           </a:p>
@@ -1815,7 +1818,7 @@
           <a:p>
             <a:fld id="{043022E0-5E5F-6244-A182-8DD32E0DF443}" type="datetimeFigureOut">
               <a:rPr kumimoji="1" lang="ko-KR" altLang="en-US" smtClean="0"/>
-              <a:t>2018. 5. 10.</a:t>
+              <a:t>2018. 5. 11.</a:t>
             </a:fld>
             <a:endParaRPr kumimoji="1" lang="ko-KR" altLang="en-US"/>
           </a:p>
@@ -1956,7 +1959,7 @@
           <a:p>
             <a:fld id="{043022E0-5E5F-6244-A182-8DD32E0DF443}" type="datetimeFigureOut">
               <a:rPr kumimoji="1" lang="ko-KR" altLang="en-US" smtClean="0"/>
-              <a:t>2018. 5. 10.</a:t>
+              <a:t>2018. 5. 11.</a:t>
             </a:fld>
             <a:endParaRPr kumimoji="1" lang="ko-KR" altLang="en-US"/>
           </a:p>
@@ -2069,7 +2072,7 @@
           <a:p>
             <a:fld id="{043022E0-5E5F-6244-A182-8DD32E0DF443}" type="datetimeFigureOut">
               <a:rPr kumimoji="1" lang="ko-KR" altLang="en-US" smtClean="0"/>
-              <a:t>2018. 5. 10.</a:t>
+              <a:t>2018. 5. 11.</a:t>
             </a:fld>
             <a:endParaRPr kumimoji="1" lang="ko-KR" altLang="en-US"/>
           </a:p>
@@ -2380,7 +2383,7 @@
           <a:p>
             <a:fld id="{043022E0-5E5F-6244-A182-8DD32E0DF443}" type="datetimeFigureOut">
               <a:rPr kumimoji="1" lang="ko-KR" altLang="en-US" smtClean="0"/>
-              <a:t>2018. 5. 10.</a:t>
+              <a:t>2018. 5. 11.</a:t>
             </a:fld>
             <a:endParaRPr kumimoji="1" lang="ko-KR" altLang="en-US"/>
           </a:p>
@@ -2668,7 +2671,7 @@
           <a:p>
             <a:fld id="{043022E0-5E5F-6244-A182-8DD32E0DF443}" type="datetimeFigureOut">
               <a:rPr kumimoji="1" lang="ko-KR" altLang="en-US" smtClean="0"/>
-              <a:t>2018. 5. 10.</a:t>
+              <a:t>2018. 5. 11.</a:t>
             </a:fld>
             <a:endParaRPr kumimoji="1" lang="ko-KR" altLang="en-US"/>
           </a:p>
@@ -2909,7 +2912,7 @@
           <a:p>
             <a:fld id="{043022E0-5E5F-6244-A182-8DD32E0DF443}" type="datetimeFigureOut">
               <a:rPr kumimoji="1" lang="ko-KR" altLang="en-US" smtClean="0"/>
-              <a:t>2018. 5. 10.</a:t>
+              <a:t>2018. 5. 11.</a:t>
             </a:fld>
             <a:endParaRPr kumimoji="1" lang="ko-KR" altLang="en-US"/>
           </a:p>
@@ -4755,6 +4758,1670 @@
 </p:sld>
 </file>
 
+<file path=ppt/slides/slide2.xml><?xml version="1.0" encoding="utf-8"?>
+<p:sld xmlns:a="http://schemas.openxmlformats.org/drawingml/2006/main" xmlns:r="http://schemas.openxmlformats.org/officeDocument/2006/relationships" xmlns:p="http://schemas.openxmlformats.org/presentationml/2006/main">
+  <p:cSld>
+    <p:spTree>
+      <p:nvGrpSpPr>
+        <p:cNvPr id="1" name=""/>
+        <p:cNvGrpSpPr/>
+        <p:nvPr/>
+      </p:nvGrpSpPr>
+      <p:grpSpPr>
+        <a:xfrm>
+          <a:off x="0" y="0"/>
+          <a:ext cx="0" cy="0"/>
+          <a:chOff x="0" y="0"/>
+          <a:chExt cx="0" cy="0"/>
+        </a:xfrm>
+      </p:grpSpPr>
+      <p:sp>
+        <p:nvSpPr>
+          <p:cNvPr id="2" name="제목 1">
+            <a:extLst>
+              <a:ext uri="{FF2B5EF4-FFF2-40B4-BE49-F238E27FC236}">
+                <a16:creationId xmlns:a16="http://schemas.microsoft.com/office/drawing/2014/main" id="{6A380FD0-62DD-7444-AA23-424C17B5CD20}"/>
+              </a:ext>
+            </a:extLst>
+          </p:cNvPr>
+          <p:cNvSpPr>
+            <a:spLocks noGrp="1"/>
+          </p:cNvSpPr>
+          <p:nvPr>
+            <p:ph type="title"/>
+          </p:nvPr>
+        </p:nvSpPr>
+        <p:spPr/>
+        <p:txBody>
+          <a:bodyPr/>
+          <a:lstStyle/>
+          <a:p>
+            <a:r>
+              <a:rPr kumimoji="1" lang="en-US" altLang="ko-KR" dirty="0"/>
+              <a:t>Basic code(</a:t>
+            </a:r>
+            <a:r>
+              <a:rPr kumimoji="1" lang="en-US" altLang="ko-KR" dirty="0" err="1"/>
+              <a:t>main.c</a:t>
+            </a:r>
+            <a:r>
+              <a:rPr kumimoji="1" lang="en-US" altLang="ko-KR" dirty="0"/>
+              <a:t>)</a:t>
+            </a:r>
+            <a:endParaRPr kumimoji="1" lang="ko-KR" altLang="en-US" dirty="0"/>
+          </a:p>
+        </p:txBody>
+      </p:sp>
+      <p:sp>
+        <p:nvSpPr>
+          <p:cNvPr id="3" name="내용 개체 틀 2">
+            <a:extLst>
+              <a:ext uri="{FF2B5EF4-FFF2-40B4-BE49-F238E27FC236}">
+                <a16:creationId xmlns:a16="http://schemas.microsoft.com/office/drawing/2014/main" id="{A269E1F8-36E7-E649-96AB-6D27B9DF4CC8}"/>
+              </a:ext>
+            </a:extLst>
+          </p:cNvPr>
+          <p:cNvSpPr>
+            <a:spLocks noGrp="1"/>
+          </p:cNvSpPr>
+          <p:nvPr>
+            <p:ph idx="1"/>
+          </p:nvPr>
+        </p:nvSpPr>
+        <p:spPr>
+          <a:xfrm>
+            <a:off x="838200" y="1825625"/>
+            <a:ext cx="4058653" cy="4351338"/>
+          </a:xfrm>
+        </p:spPr>
+        <p:txBody>
+          <a:bodyPr/>
+          <a:lstStyle/>
+          <a:p>
+            <a:pPr marL="0" indent="0">
+              <a:buNone/>
+            </a:pPr>
+            <a:r>
+              <a:rPr lang="en" altLang="ko-KR" dirty="0"/>
+              <a:t>#include &lt;</a:t>
+            </a:r>
+            <a:r>
+              <a:rPr lang="en" altLang="ko-KR" dirty="0" err="1"/>
+              <a:t>stdio.h</a:t>
+            </a:r>
+            <a:r>
+              <a:rPr lang="en" altLang="ko-KR" dirty="0"/>
+              <a:t>&gt;</a:t>
+            </a:r>
+          </a:p>
+          <a:p>
+            <a:pPr marL="0" indent="0">
+              <a:buNone/>
+            </a:pPr>
+            <a:r>
+              <a:rPr lang="en" altLang="ko-KR" dirty="0"/>
+              <a:t>#include &lt;</a:t>
+            </a:r>
+            <a:r>
+              <a:rPr lang="en" altLang="ko-KR" dirty="0" err="1"/>
+              <a:t>string.h</a:t>
+            </a:r>
+            <a:r>
+              <a:rPr lang="en" altLang="ko-KR" dirty="0"/>
+              <a:t>&gt;</a:t>
+            </a:r>
+          </a:p>
+          <a:p>
+            <a:pPr marL="0" indent="0">
+              <a:buNone/>
+            </a:pPr>
+            <a:r>
+              <a:rPr lang="en" altLang="ko-KR" dirty="0"/>
+              <a:t>#include &lt;</a:t>
+            </a:r>
+            <a:r>
+              <a:rPr lang="en" altLang="ko-KR" dirty="0" err="1"/>
+              <a:t>fcntl.h</a:t>
+            </a:r>
+            <a:r>
+              <a:rPr lang="en" altLang="ko-KR" dirty="0"/>
+              <a:t>&gt;</a:t>
+            </a:r>
+          </a:p>
+          <a:p>
+            <a:pPr marL="0" indent="0">
+              <a:buNone/>
+            </a:pPr>
+            <a:r>
+              <a:rPr lang="en" altLang="ko-KR" dirty="0"/>
+              <a:t>#include &lt;</a:t>
+            </a:r>
+            <a:r>
+              <a:rPr lang="en" altLang="ko-KR" dirty="0" err="1"/>
+              <a:t>termios.h</a:t>
+            </a:r>
+            <a:r>
+              <a:rPr lang="en" altLang="ko-KR" dirty="0"/>
+              <a:t>&gt;</a:t>
+            </a:r>
+          </a:p>
+          <a:p>
+            <a:pPr marL="0" indent="0">
+              <a:buNone/>
+            </a:pPr>
+            <a:r>
+              <a:rPr lang="en" altLang="ko-KR" dirty="0"/>
+              <a:t>#include &lt;</a:t>
+            </a:r>
+            <a:r>
+              <a:rPr lang="en" altLang="ko-KR" dirty="0" err="1"/>
+              <a:t>unistd.h</a:t>
+            </a:r>
+            <a:r>
+              <a:rPr lang="en" altLang="ko-KR" dirty="0"/>
+              <a:t>&gt;</a:t>
+            </a:r>
+          </a:p>
+          <a:p>
+            <a:pPr marL="0" indent="0">
+              <a:buNone/>
+            </a:pPr>
+            <a:r>
+              <a:rPr lang="en" altLang="ko-KR" dirty="0"/>
+              <a:t>#include &lt;</a:t>
+            </a:r>
+            <a:r>
+              <a:rPr lang="en" altLang="ko-KR" dirty="0" err="1"/>
+              <a:t>curses.h</a:t>
+            </a:r>
+            <a:r>
+              <a:rPr lang="en" altLang="ko-KR" dirty="0"/>
+              <a:t>&gt;</a:t>
+            </a:r>
+          </a:p>
+          <a:p>
+            <a:pPr marL="0" indent="0">
+              <a:buNone/>
+            </a:pPr>
+            <a:r>
+              <a:rPr lang="en" altLang="ko-KR" dirty="0"/>
+              <a:t>#include &lt;sys/</a:t>
+            </a:r>
+            <a:r>
+              <a:rPr lang="en" altLang="ko-KR" dirty="0" err="1"/>
+              <a:t>time.h</a:t>
+            </a:r>
+            <a:r>
+              <a:rPr lang="en" altLang="ko-KR" dirty="0"/>
+              <a:t>&gt;</a:t>
+            </a:r>
+          </a:p>
+          <a:p>
+            <a:pPr marL="0" indent="0">
+              <a:buNone/>
+            </a:pPr>
+            <a:endParaRPr kumimoji="1" lang="ko-KR" altLang="en-US" dirty="0"/>
+          </a:p>
+        </p:txBody>
+      </p:sp>
+      <p:sp>
+        <p:nvSpPr>
+          <p:cNvPr id="4" name="내용 개체 틀 2">
+            <a:extLst>
+              <a:ext uri="{FF2B5EF4-FFF2-40B4-BE49-F238E27FC236}">
+                <a16:creationId xmlns:a16="http://schemas.microsoft.com/office/drawing/2014/main" id="{6305A302-E538-F24A-A6B3-D05D7419FAC0}"/>
+              </a:ext>
+            </a:extLst>
+          </p:cNvPr>
+          <p:cNvSpPr txBox="1">
+            <a:spLocks/>
+          </p:cNvSpPr>
+          <p:nvPr/>
+        </p:nvSpPr>
+        <p:spPr>
+          <a:xfrm>
+            <a:off x="6328611" y="1825625"/>
+            <a:ext cx="5558589" cy="4351338"/>
+          </a:xfrm>
+          <a:prstGeom prst="rect">
+            <a:avLst/>
+          </a:prstGeom>
+        </p:spPr>
+        <p:txBody>
+          <a:bodyPr vert="horz" lIns="91440" tIns="45720" rIns="91440" bIns="45720" rtlCol="0">
+            <a:normAutofit/>
+          </a:bodyPr>
+          <a:lstStyle>
+            <a:lvl1pPr marL="228600" indent="-228600" algn="l" defTabSz="914400" rtl="0" eaLnBrk="1" latinLnBrk="1" hangingPunct="1">
+              <a:lnSpc>
+                <a:spcPct val="90000"/>
+              </a:lnSpc>
+              <a:spcBef>
+                <a:spcPts val="1000"/>
+              </a:spcBef>
+              <a:buFont typeface="Arial" panose="020B0604020202020204" pitchFamily="34" charset="0"/>
+              <a:buChar char="•"/>
+              <a:defRPr sz="2800" kern="1200">
+                <a:solidFill>
+                  <a:schemeClr val="tx1"/>
+                </a:solidFill>
+                <a:latin typeface="+mn-lt"/>
+                <a:ea typeface="+mn-ea"/>
+                <a:cs typeface="+mn-cs"/>
+              </a:defRPr>
+            </a:lvl1pPr>
+            <a:lvl2pPr marL="685800" indent="-228600" algn="l" defTabSz="914400" rtl="0" eaLnBrk="1" latinLnBrk="1" hangingPunct="1">
+              <a:lnSpc>
+                <a:spcPct val="90000"/>
+              </a:lnSpc>
+              <a:spcBef>
+                <a:spcPts val="500"/>
+              </a:spcBef>
+              <a:buFont typeface="Arial" panose="020B0604020202020204" pitchFamily="34" charset="0"/>
+              <a:buChar char="•"/>
+              <a:defRPr sz="2400" kern="1200">
+                <a:solidFill>
+                  <a:schemeClr val="tx1"/>
+                </a:solidFill>
+                <a:latin typeface="+mn-lt"/>
+                <a:ea typeface="+mn-ea"/>
+                <a:cs typeface="+mn-cs"/>
+              </a:defRPr>
+            </a:lvl2pPr>
+            <a:lvl3pPr marL="1143000" indent="-228600" algn="l" defTabSz="914400" rtl="0" eaLnBrk="1" latinLnBrk="1" hangingPunct="1">
+              <a:lnSpc>
+                <a:spcPct val="90000"/>
+              </a:lnSpc>
+              <a:spcBef>
+                <a:spcPts val="500"/>
+              </a:spcBef>
+              <a:buFont typeface="Arial" panose="020B0604020202020204" pitchFamily="34" charset="0"/>
+              <a:buChar char="•"/>
+              <a:defRPr sz="2000" kern="1200">
+                <a:solidFill>
+                  <a:schemeClr val="tx1"/>
+                </a:solidFill>
+                <a:latin typeface="+mn-lt"/>
+                <a:ea typeface="+mn-ea"/>
+                <a:cs typeface="+mn-cs"/>
+              </a:defRPr>
+            </a:lvl3pPr>
+            <a:lvl4pPr marL="1600200" indent="-228600" algn="l" defTabSz="914400" rtl="0" eaLnBrk="1" latinLnBrk="1" hangingPunct="1">
+              <a:lnSpc>
+                <a:spcPct val="90000"/>
+              </a:lnSpc>
+              <a:spcBef>
+                <a:spcPts val="500"/>
+              </a:spcBef>
+              <a:buFont typeface="Arial" panose="020B0604020202020204" pitchFamily="34" charset="0"/>
+              <a:buChar char="•"/>
+              <a:defRPr sz="1800" kern="1200">
+                <a:solidFill>
+                  <a:schemeClr val="tx1"/>
+                </a:solidFill>
+                <a:latin typeface="+mn-lt"/>
+                <a:ea typeface="+mn-ea"/>
+                <a:cs typeface="+mn-cs"/>
+              </a:defRPr>
+            </a:lvl4pPr>
+            <a:lvl5pPr marL="2057400" indent="-228600" algn="l" defTabSz="914400" rtl="0" eaLnBrk="1" latinLnBrk="1" hangingPunct="1">
+              <a:lnSpc>
+                <a:spcPct val="90000"/>
+              </a:lnSpc>
+              <a:spcBef>
+                <a:spcPts val="500"/>
+              </a:spcBef>
+              <a:buFont typeface="Arial" panose="020B0604020202020204" pitchFamily="34" charset="0"/>
+              <a:buChar char="•"/>
+              <a:defRPr sz="1800" kern="1200">
+                <a:solidFill>
+                  <a:schemeClr val="tx1"/>
+                </a:solidFill>
+                <a:latin typeface="+mn-lt"/>
+                <a:ea typeface="+mn-ea"/>
+                <a:cs typeface="+mn-cs"/>
+              </a:defRPr>
+            </a:lvl5pPr>
+            <a:lvl6pPr marL="2514600" indent="-228600" algn="l" defTabSz="914400" rtl="0" eaLnBrk="1" latinLnBrk="1" hangingPunct="1">
+              <a:lnSpc>
+                <a:spcPct val="90000"/>
+              </a:lnSpc>
+              <a:spcBef>
+                <a:spcPts val="500"/>
+              </a:spcBef>
+              <a:buFont typeface="Arial" panose="020B0604020202020204" pitchFamily="34" charset="0"/>
+              <a:buChar char="•"/>
+              <a:defRPr sz="1800" kern="1200">
+                <a:solidFill>
+                  <a:schemeClr val="tx1"/>
+                </a:solidFill>
+                <a:latin typeface="+mn-lt"/>
+                <a:ea typeface="+mn-ea"/>
+                <a:cs typeface="+mn-cs"/>
+              </a:defRPr>
+            </a:lvl6pPr>
+            <a:lvl7pPr marL="2971800" indent="-228600" algn="l" defTabSz="914400" rtl="0" eaLnBrk="1" latinLnBrk="1" hangingPunct="1">
+              <a:lnSpc>
+                <a:spcPct val="90000"/>
+              </a:lnSpc>
+              <a:spcBef>
+                <a:spcPts val="500"/>
+              </a:spcBef>
+              <a:buFont typeface="Arial" panose="020B0604020202020204" pitchFamily="34" charset="0"/>
+              <a:buChar char="•"/>
+              <a:defRPr sz="1800" kern="1200">
+                <a:solidFill>
+                  <a:schemeClr val="tx1"/>
+                </a:solidFill>
+                <a:latin typeface="+mn-lt"/>
+                <a:ea typeface="+mn-ea"/>
+                <a:cs typeface="+mn-cs"/>
+              </a:defRPr>
+            </a:lvl7pPr>
+            <a:lvl8pPr marL="3429000" indent="-228600" algn="l" defTabSz="914400" rtl="0" eaLnBrk="1" latinLnBrk="1" hangingPunct="1">
+              <a:lnSpc>
+                <a:spcPct val="90000"/>
+              </a:lnSpc>
+              <a:spcBef>
+                <a:spcPts val="500"/>
+              </a:spcBef>
+              <a:buFont typeface="Arial" panose="020B0604020202020204" pitchFamily="34" charset="0"/>
+              <a:buChar char="•"/>
+              <a:defRPr sz="1800" kern="1200">
+                <a:solidFill>
+                  <a:schemeClr val="tx1"/>
+                </a:solidFill>
+                <a:latin typeface="+mn-lt"/>
+                <a:ea typeface="+mn-ea"/>
+                <a:cs typeface="+mn-cs"/>
+              </a:defRPr>
+            </a:lvl8pPr>
+            <a:lvl9pPr marL="3886200" indent="-228600" algn="l" defTabSz="914400" rtl="0" eaLnBrk="1" latinLnBrk="1" hangingPunct="1">
+              <a:lnSpc>
+                <a:spcPct val="90000"/>
+              </a:lnSpc>
+              <a:spcBef>
+                <a:spcPts val="500"/>
+              </a:spcBef>
+              <a:buFont typeface="Arial" panose="020B0604020202020204" pitchFamily="34" charset="0"/>
+              <a:buChar char="•"/>
+              <a:defRPr sz="1800" kern="1200">
+                <a:solidFill>
+                  <a:schemeClr val="tx1"/>
+                </a:solidFill>
+                <a:latin typeface="+mn-lt"/>
+                <a:ea typeface="+mn-ea"/>
+                <a:cs typeface="+mn-cs"/>
+              </a:defRPr>
+            </a:lvl9pPr>
+          </a:lstStyle>
+          <a:p>
+            <a:pPr marL="0" indent="0">
+              <a:buNone/>
+            </a:pPr>
+            <a:r>
+              <a:rPr lang="en" altLang="ko-KR" dirty="0"/>
+              <a:t>void </a:t>
+            </a:r>
+            <a:r>
+              <a:rPr lang="en" altLang="ko-KR" dirty="0" err="1"/>
+              <a:t>set_nodelay_mode</a:t>
+            </a:r>
+            <a:r>
+              <a:rPr lang="en" altLang="ko-KR" dirty="0"/>
+              <a:t>(){</a:t>
+            </a:r>
+          </a:p>
+          <a:p>
+            <a:pPr marL="0" indent="0">
+              <a:buNone/>
+            </a:pPr>
+            <a:r>
+              <a:rPr lang="en" altLang="ko-KR" dirty="0"/>
+              <a:t>    </a:t>
+            </a:r>
+            <a:r>
+              <a:rPr lang="en" altLang="ko-KR" dirty="0" err="1"/>
+              <a:t>int</a:t>
+            </a:r>
+            <a:r>
+              <a:rPr lang="en" altLang="ko-KR" dirty="0"/>
+              <a:t> </a:t>
+            </a:r>
+            <a:r>
+              <a:rPr lang="en" altLang="ko-KR" dirty="0" err="1"/>
+              <a:t>termflags</a:t>
+            </a:r>
+            <a:r>
+              <a:rPr lang="en" altLang="ko-KR" dirty="0"/>
+              <a:t>;</a:t>
+            </a:r>
+          </a:p>
+          <a:p>
+            <a:pPr marL="0" indent="0">
+              <a:buNone/>
+            </a:pPr>
+            <a:r>
+              <a:rPr lang="en" altLang="ko-KR" dirty="0"/>
+              <a:t>    </a:t>
+            </a:r>
+            <a:r>
+              <a:rPr lang="en" altLang="ko-KR" dirty="0" err="1"/>
+              <a:t>termflags</a:t>
+            </a:r>
+            <a:r>
+              <a:rPr lang="en" altLang="ko-KR" dirty="0"/>
+              <a:t>=</a:t>
+            </a:r>
+            <a:r>
+              <a:rPr lang="en" altLang="ko-KR" dirty="0" err="1"/>
+              <a:t>fcntl</a:t>
+            </a:r>
+            <a:r>
+              <a:rPr lang="en" altLang="ko-KR" dirty="0"/>
+              <a:t>(0,F_GETFL);</a:t>
+            </a:r>
+          </a:p>
+          <a:p>
+            <a:pPr marL="0" indent="0">
+              <a:buNone/>
+            </a:pPr>
+            <a:r>
+              <a:rPr lang="en" altLang="ko-KR" dirty="0"/>
+              <a:t>    </a:t>
+            </a:r>
+            <a:r>
+              <a:rPr lang="en" altLang="ko-KR" dirty="0" err="1"/>
+              <a:t>termflags</a:t>
+            </a:r>
+            <a:r>
+              <a:rPr lang="en" altLang="ko-KR" dirty="0"/>
+              <a:t> |=O_NDELAY;</a:t>
+            </a:r>
+          </a:p>
+          <a:p>
+            <a:pPr marL="0" indent="0">
+              <a:buNone/>
+            </a:pPr>
+            <a:r>
+              <a:rPr lang="en" altLang="ko-KR" dirty="0"/>
+              <a:t>    </a:t>
+            </a:r>
+            <a:r>
+              <a:rPr lang="en" altLang="ko-KR" dirty="0" err="1"/>
+              <a:t>fcntl</a:t>
+            </a:r>
+            <a:r>
+              <a:rPr lang="en" altLang="ko-KR" dirty="0"/>
+              <a:t>(0, </a:t>
+            </a:r>
+            <a:r>
+              <a:rPr lang="en" altLang="ko-KR" dirty="0" err="1"/>
+              <a:t>F_SETFL,termflags</a:t>
+            </a:r>
+            <a:r>
+              <a:rPr lang="en" altLang="ko-KR" dirty="0"/>
+              <a:t>);</a:t>
+            </a:r>
+          </a:p>
+          <a:p>
+            <a:pPr marL="0" indent="0">
+              <a:buNone/>
+            </a:pPr>
+            <a:r>
+              <a:rPr lang="en" altLang="ko-KR" dirty="0"/>
+              <a:t>}//</a:t>
+            </a:r>
+            <a:r>
+              <a:rPr lang="ko-KR" altLang="en-US" dirty="0"/>
+              <a:t>입력</a:t>
+            </a:r>
+            <a:r>
+              <a:rPr lang="en-US" altLang="ko-KR" dirty="0"/>
+              <a:t>(</a:t>
+            </a:r>
+            <a:r>
+              <a:rPr lang="en-US" altLang="ko-KR" dirty="0" err="1"/>
+              <a:t>getchar</a:t>
+            </a:r>
+            <a:r>
+              <a:rPr lang="en-US" altLang="ko-KR" dirty="0"/>
+              <a:t>)</a:t>
+            </a:r>
+            <a:r>
+              <a:rPr lang="ko-KR" altLang="en-US" dirty="0"/>
+              <a:t>을 </a:t>
+            </a:r>
+            <a:r>
+              <a:rPr lang="ko-KR" altLang="en-US" dirty="0" err="1"/>
+              <a:t>딜레이없이</a:t>
+            </a:r>
+            <a:r>
+              <a:rPr lang="ko-KR" altLang="en-US" dirty="0"/>
+              <a:t> 받는 함수</a:t>
+            </a:r>
+            <a:br>
+              <a:rPr lang="en" altLang="ko-KR" dirty="0"/>
+            </a:br>
+            <a:endParaRPr lang="en" altLang="ko-KR" dirty="0"/>
+          </a:p>
+          <a:p>
+            <a:pPr marL="0" indent="0">
+              <a:buFont typeface="Arial" panose="020B0604020202020204" pitchFamily="34" charset="0"/>
+              <a:buNone/>
+            </a:pPr>
+            <a:endParaRPr kumimoji="1" lang="ko-KR" altLang="en-US" dirty="0"/>
+          </a:p>
+        </p:txBody>
+      </p:sp>
+    </p:spTree>
+    <p:extLst>
+      <p:ext uri="{BB962C8B-B14F-4D97-AF65-F5344CB8AC3E}">
+        <p14:creationId xmlns:p14="http://schemas.microsoft.com/office/powerpoint/2010/main" val="3571901798"/>
+      </p:ext>
+    </p:extLst>
+  </p:cSld>
+  <p:clrMapOvr>
+    <a:masterClrMapping/>
+  </p:clrMapOvr>
+</p:sld>
+</file>
+
+<file path=ppt/slides/slide3.xml><?xml version="1.0" encoding="utf-8"?>
+<p:sld xmlns:a="http://schemas.openxmlformats.org/drawingml/2006/main" xmlns:r="http://schemas.openxmlformats.org/officeDocument/2006/relationships" xmlns:p="http://schemas.openxmlformats.org/presentationml/2006/main">
+  <p:cSld>
+    <p:spTree>
+      <p:nvGrpSpPr>
+        <p:cNvPr id="1" name=""/>
+        <p:cNvGrpSpPr/>
+        <p:nvPr/>
+      </p:nvGrpSpPr>
+      <p:grpSpPr>
+        <a:xfrm>
+          <a:off x="0" y="0"/>
+          <a:ext cx="0" cy="0"/>
+          <a:chOff x="0" y="0"/>
+          <a:chExt cx="0" cy="0"/>
+        </a:xfrm>
+      </p:grpSpPr>
+      <p:sp>
+        <p:nvSpPr>
+          <p:cNvPr id="2" name="제목 1">
+            <a:extLst>
+              <a:ext uri="{FF2B5EF4-FFF2-40B4-BE49-F238E27FC236}">
+                <a16:creationId xmlns:a16="http://schemas.microsoft.com/office/drawing/2014/main" id="{6A380FD0-62DD-7444-AA23-424C17B5CD20}"/>
+              </a:ext>
+            </a:extLst>
+          </p:cNvPr>
+          <p:cNvSpPr>
+            <a:spLocks noGrp="1"/>
+          </p:cNvSpPr>
+          <p:nvPr>
+            <p:ph type="title"/>
+          </p:nvPr>
+        </p:nvSpPr>
+        <p:spPr/>
+        <p:txBody>
+          <a:bodyPr/>
+          <a:lstStyle/>
+          <a:p>
+            <a:r>
+              <a:rPr kumimoji="1" lang="en-US" altLang="ko-KR" dirty="0"/>
+              <a:t>Basic code(</a:t>
+            </a:r>
+            <a:r>
+              <a:rPr kumimoji="1" lang="en-US" altLang="ko-KR" dirty="0" err="1"/>
+              <a:t>main.c</a:t>
+            </a:r>
+            <a:r>
+              <a:rPr kumimoji="1" lang="en-US" altLang="ko-KR" dirty="0"/>
+              <a:t>)</a:t>
+            </a:r>
+            <a:endParaRPr kumimoji="1" lang="ko-KR" altLang="en-US" dirty="0"/>
+          </a:p>
+        </p:txBody>
+      </p:sp>
+      <p:sp>
+        <p:nvSpPr>
+          <p:cNvPr id="3" name="내용 개체 틀 2">
+            <a:extLst>
+              <a:ext uri="{FF2B5EF4-FFF2-40B4-BE49-F238E27FC236}">
+                <a16:creationId xmlns:a16="http://schemas.microsoft.com/office/drawing/2014/main" id="{A269E1F8-36E7-E649-96AB-6D27B9DF4CC8}"/>
+              </a:ext>
+            </a:extLst>
+          </p:cNvPr>
+          <p:cNvSpPr>
+            <a:spLocks noGrp="1"/>
+          </p:cNvSpPr>
+          <p:nvPr>
+            <p:ph idx="1"/>
+          </p:nvPr>
+        </p:nvSpPr>
+        <p:spPr>
+          <a:xfrm>
+            <a:off x="838199" y="1825625"/>
+            <a:ext cx="5081338" cy="4351338"/>
+          </a:xfrm>
+        </p:spPr>
+        <p:txBody>
+          <a:bodyPr>
+            <a:normAutofit fontScale="92500" lnSpcReduction="10000"/>
+          </a:bodyPr>
+          <a:lstStyle/>
+          <a:p>
+            <a:pPr marL="0" indent="0">
+              <a:buNone/>
+            </a:pPr>
+            <a:r>
+              <a:rPr lang="en" altLang="ko-KR" sz="2400" dirty="0"/>
+              <a:t>void </a:t>
+            </a:r>
+            <a:r>
+              <a:rPr lang="en" altLang="ko-KR" sz="2400" dirty="0" err="1"/>
+              <a:t>init_keyboard</a:t>
+            </a:r>
+            <a:r>
+              <a:rPr lang="en" altLang="ko-KR" sz="2400" dirty="0"/>
+              <a:t>()</a:t>
+            </a:r>
+          </a:p>
+          <a:p>
+            <a:pPr marL="0" indent="0">
+              <a:buNone/>
+            </a:pPr>
+            <a:r>
+              <a:rPr lang="en" altLang="ko-KR" sz="2400" dirty="0"/>
+              <a:t>{</a:t>
+            </a:r>
+          </a:p>
+          <a:p>
+            <a:pPr marL="0" indent="0">
+              <a:buNone/>
+            </a:pPr>
+            <a:r>
+              <a:rPr lang="en" altLang="ko-KR" sz="2400" dirty="0"/>
+              <a:t>    </a:t>
+            </a:r>
+            <a:r>
+              <a:rPr lang="en" altLang="ko-KR" sz="2400" dirty="0" err="1"/>
+              <a:t>tcgetattr</a:t>
+            </a:r>
+            <a:r>
+              <a:rPr lang="en" altLang="ko-KR" sz="2400" dirty="0"/>
+              <a:t>(0,&amp;initial_settings);</a:t>
+            </a:r>
+          </a:p>
+          <a:p>
+            <a:pPr marL="0" indent="0">
+              <a:buNone/>
+            </a:pPr>
+            <a:r>
+              <a:rPr lang="en" altLang="ko-KR" sz="2400" dirty="0"/>
+              <a:t>    </a:t>
+            </a:r>
+            <a:r>
+              <a:rPr lang="en" altLang="ko-KR" sz="2400" dirty="0" err="1"/>
+              <a:t>new_settings</a:t>
+            </a:r>
+            <a:r>
+              <a:rPr lang="en" altLang="ko-KR" sz="2400" dirty="0"/>
+              <a:t> = </a:t>
+            </a:r>
+            <a:r>
+              <a:rPr lang="en" altLang="ko-KR" sz="2400" dirty="0" err="1"/>
+              <a:t>initial_settings</a:t>
+            </a:r>
+            <a:r>
+              <a:rPr lang="en" altLang="ko-KR" sz="2400" dirty="0"/>
+              <a:t>;</a:t>
+            </a:r>
+          </a:p>
+          <a:p>
+            <a:pPr marL="0" indent="0">
+              <a:buNone/>
+            </a:pPr>
+            <a:r>
+              <a:rPr lang="en" altLang="ko-KR" sz="2400" dirty="0"/>
+              <a:t>    </a:t>
+            </a:r>
+            <a:r>
+              <a:rPr lang="en" altLang="ko-KR" sz="2400" dirty="0" err="1"/>
+              <a:t>new_settings.c_lflag</a:t>
+            </a:r>
+            <a:r>
+              <a:rPr lang="en" altLang="ko-KR" sz="2400" dirty="0"/>
+              <a:t> &amp;= ~ICANON;</a:t>
+            </a:r>
+          </a:p>
+          <a:p>
+            <a:pPr marL="0" indent="0">
+              <a:buNone/>
+            </a:pPr>
+            <a:r>
+              <a:rPr lang="en" altLang="ko-KR" sz="2400" dirty="0"/>
+              <a:t>    </a:t>
+            </a:r>
+            <a:r>
+              <a:rPr lang="en" altLang="ko-KR" sz="2400" dirty="0" err="1"/>
+              <a:t>new_settings.c_lflag</a:t>
+            </a:r>
+            <a:r>
+              <a:rPr lang="en" altLang="ko-KR" sz="2400" dirty="0"/>
+              <a:t> &amp;= ~ECHO;</a:t>
+            </a:r>
+          </a:p>
+          <a:p>
+            <a:pPr marL="0" indent="0">
+              <a:buNone/>
+            </a:pPr>
+            <a:r>
+              <a:rPr lang="en" altLang="ko-KR" sz="2400" dirty="0"/>
+              <a:t>    </a:t>
+            </a:r>
+            <a:r>
+              <a:rPr lang="en" altLang="ko-KR" sz="2400" dirty="0" err="1"/>
+              <a:t>new_settings.c_cc</a:t>
+            </a:r>
+            <a:r>
+              <a:rPr lang="en" altLang="ko-KR" sz="2400" dirty="0"/>
+              <a:t>[VMIN] = 1;</a:t>
+            </a:r>
+          </a:p>
+          <a:p>
+            <a:pPr marL="0" indent="0">
+              <a:buNone/>
+            </a:pPr>
+            <a:r>
+              <a:rPr lang="en" altLang="ko-KR" sz="2400" dirty="0"/>
+              <a:t>    </a:t>
+            </a:r>
+            <a:r>
+              <a:rPr lang="en" altLang="ko-KR" sz="2400" dirty="0" err="1"/>
+              <a:t>new_settings.c_cc</a:t>
+            </a:r>
+            <a:r>
+              <a:rPr lang="en" altLang="ko-KR" sz="2400" dirty="0"/>
+              <a:t>[VTIME] = 0;</a:t>
+            </a:r>
+          </a:p>
+          <a:p>
+            <a:pPr marL="0" indent="0">
+              <a:buNone/>
+            </a:pPr>
+            <a:r>
+              <a:rPr lang="en" altLang="ko-KR" sz="2400" dirty="0"/>
+              <a:t>    </a:t>
+            </a:r>
+            <a:r>
+              <a:rPr lang="en" altLang="ko-KR" sz="2400" dirty="0" err="1"/>
+              <a:t>tcsetattr</a:t>
+            </a:r>
+            <a:r>
+              <a:rPr lang="en" altLang="ko-KR" sz="2400" dirty="0"/>
+              <a:t>(0, TCSANOW, &amp;</a:t>
+            </a:r>
+            <a:r>
+              <a:rPr lang="en" altLang="ko-KR" sz="2400" dirty="0" err="1"/>
+              <a:t>new_settings</a:t>
+            </a:r>
+            <a:r>
+              <a:rPr lang="en" altLang="ko-KR" sz="2400" dirty="0"/>
+              <a:t>);</a:t>
+            </a:r>
+          </a:p>
+          <a:p>
+            <a:pPr marL="0" indent="0">
+              <a:buNone/>
+            </a:pPr>
+            <a:r>
+              <a:rPr lang="en" altLang="ko-KR" sz="2400" dirty="0"/>
+              <a:t>}//</a:t>
+            </a:r>
+            <a:r>
+              <a:rPr lang="ko-KR" altLang="en-US" sz="2400" dirty="0"/>
+              <a:t>터미널 모드 설정</a:t>
+            </a:r>
+            <a:r>
+              <a:rPr lang="en-US" altLang="ko-KR" sz="2400" dirty="0"/>
+              <a:t>(~</a:t>
+            </a:r>
+            <a:r>
+              <a:rPr lang="en-US" altLang="ko-KR" sz="2400" dirty="0" err="1"/>
+              <a:t>icanon</a:t>
+            </a:r>
+            <a:r>
+              <a:rPr lang="en-US" altLang="ko-KR" sz="2400" dirty="0"/>
+              <a:t>,~echo)</a:t>
+            </a:r>
+            <a:endParaRPr lang="en" altLang="ko-KR" sz="2400" dirty="0"/>
+          </a:p>
+          <a:p>
+            <a:pPr marL="0" indent="0">
+              <a:buNone/>
+            </a:pPr>
+            <a:endParaRPr kumimoji="1" lang="ko-KR" altLang="en-US" dirty="0"/>
+          </a:p>
+        </p:txBody>
+      </p:sp>
+      <p:sp>
+        <p:nvSpPr>
+          <p:cNvPr id="4" name="내용 개체 틀 2">
+            <a:extLst>
+              <a:ext uri="{FF2B5EF4-FFF2-40B4-BE49-F238E27FC236}">
+                <a16:creationId xmlns:a16="http://schemas.microsoft.com/office/drawing/2014/main" id="{6305A302-E538-F24A-A6B3-D05D7419FAC0}"/>
+              </a:ext>
+            </a:extLst>
+          </p:cNvPr>
+          <p:cNvSpPr txBox="1">
+            <a:spLocks/>
+          </p:cNvSpPr>
+          <p:nvPr/>
+        </p:nvSpPr>
+        <p:spPr>
+          <a:xfrm>
+            <a:off x="6328611" y="1825625"/>
+            <a:ext cx="5594684" cy="4563144"/>
+          </a:xfrm>
+          <a:prstGeom prst="rect">
+            <a:avLst/>
+          </a:prstGeom>
+        </p:spPr>
+        <p:txBody>
+          <a:bodyPr vert="horz" lIns="91440" tIns="45720" rIns="91440" bIns="45720" rtlCol="0">
+            <a:normAutofit/>
+          </a:bodyPr>
+          <a:lstStyle>
+            <a:lvl1pPr marL="228600" indent="-228600" algn="l" defTabSz="914400" rtl="0" eaLnBrk="1" latinLnBrk="1" hangingPunct="1">
+              <a:lnSpc>
+                <a:spcPct val="90000"/>
+              </a:lnSpc>
+              <a:spcBef>
+                <a:spcPts val="1000"/>
+              </a:spcBef>
+              <a:buFont typeface="Arial" panose="020B0604020202020204" pitchFamily="34" charset="0"/>
+              <a:buChar char="•"/>
+              <a:defRPr sz="2800" kern="1200">
+                <a:solidFill>
+                  <a:schemeClr val="tx1"/>
+                </a:solidFill>
+                <a:latin typeface="+mn-lt"/>
+                <a:ea typeface="+mn-ea"/>
+                <a:cs typeface="+mn-cs"/>
+              </a:defRPr>
+            </a:lvl1pPr>
+            <a:lvl2pPr marL="685800" indent="-228600" algn="l" defTabSz="914400" rtl="0" eaLnBrk="1" latinLnBrk="1" hangingPunct="1">
+              <a:lnSpc>
+                <a:spcPct val="90000"/>
+              </a:lnSpc>
+              <a:spcBef>
+                <a:spcPts val="500"/>
+              </a:spcBef>
+              <a:buFont typeface="Arial" panose="020B0604020202020204" pitchFamily="34" charset="0"/>
+              <a:buChar char="•"/>
+              <a:defRPr sz="2400" kern="1200">
+                <a:solidFill>
+                  <a:schemeClr val="tx1"/>
+                </a:solidFill>
+                <a:latin typeface="+mn-lt"/>
+                <a:ea typeface="+mn-ea"/>
+                <a:cs typeface="+mn-cs"/>
+              </a:defRPr>
+            </a:lvl2pPr>
+            <a:lvl3pPr marL="1143000" indent="-228600" algn="l" defTabSz="914400" rtl="0" eaLnBrk="1" latinLnBrk="1" hangingPunct="1">
+              <a:lnSpc>
+                <a:spcPct val="90000"/>
+              </a:lnSpc>
+              <a:spcBef>
+                <a:spcPts val="500"/>
+              </a:spcBef>
+              <a:buFont typeface="Arial" panose="020B0604020202020204" pitchFamily="34" charset="0"/>
+              <a:buChar char="•"/>
+              <a:defRPr sz="2000" kern="1200">
+                <a:solidFill>
+                  <a:schemeClr val="tx1"/>
+                </a:solidFill>
+                <a:latin typeface="+mn-lt"/>
+                <a:ea typeface="+mn-ea"/>
+                <a:cs typeface="+mn-cs"/>
+              </a:defRPr>
+            </a:lvl3pPr>
+            <a:lvl4pPr marL="1600200" indent="-228600" algn="l" defTabSz="914400" rtl="0" eaLnBrk="1" latinLnBrk="1" hangingPunct="1">
+              <a:lnSpc>
+                <a:spcPct val="90000"/>
+              </a:lnSpc>
+              <a:spcBef>
+                <a:spcPts val="500"/>
+              </a:spcBef>
+              <a:buFont typeface="Arial" panose="020B0604020202020204" pitchFamily="34" charset="0"/>
+              <a:buChar char="•"/>
+              <a:defRPr sz="1800" kern="1200">
+                <a:solidFill>
+                  <a:schemeClr val="tx1"/>
+                </a:solidFill>
+                <a:latin typeface="+mn-lt"/>
+                <a:ea typeface="+mn-ea"/>
+                <a:cs typeface="+mn-cs"/>
+              </a:defRPr>
+            </a:lvl4pPr>
+            <a:lvl5pPr marL="2057400" indent="-228600" algn="l" defTabSz="914400" rtl="0" eaLnBrk="1" latinLnBrk="1" hangingPunct="1">
+              <a:lnSpc>
+                <a:spcPct val="90000"/>
+              </a:lnSpc>
+              <a:spcBef>
+                <a:spcPts val="500"/>
+              </a:spcBef>
+              <a:buFont typeface="Arial" panose="020B0604020202020204" pitchFamily="34" charset="0"/>
+              <a:buChar char="•"/>
+              <a:defRPr sz="1800" kern="1200">
+                <a:solidFill>
+                  <a:schemeClr val="tx1"/>
+                </a:solidFill>
+                <a:latin typeface="+mn-lt"/>
+                <a:ea typeface="+mn-ea"/>
+                <a:cs typeface="+mn-cs"/>
+              </a:defRPr>
+            </a:lvl5pPr>
+            <a:lvl6pPr marL="2514600" indent="-228600" algn="l" defTabSz="914400" rtl="0" eaLnBrk="1" latinLnBrk="1" hangingPunct="1">
+              <a:lnSpc>
+                <a:spcPct val="90000"/>
+              </a:lnSpc>
+              <a:spcBef>
+                <a:spcPts val="500"/>
+              </a:spcBef>
+              <a:buFont typeface="Arial" panose="020B0604020202020204" pitchFamily="34" charset="0"/>
+              <a:buChar char="•"/>
+              <a:defRPr sz="1800" kern="1200">
+                <a:solidFill>
+                  <a:schemeClr val="tx1"/>
+                </a:solidFill>
+                <a:latin typeface="+mn-lt"/>
+                <a:ea typeface="+mn-ea"/>
+                <a:cs typeface="+mn-cs"/>
+              </a:defRPr>
+            </a:lvl6pPr>
+            <a:lvl7pPr marL="2971800" indent="-228600" algn="l" defTabSz="914400" rtl="0" eaLnBrk="1" latinLnBrk="1" hangingPunct="1">
+              <a:lnSpc>
+                <a:spcPct val="90000"/>
+              </a:lnSpc>
+              <a:spcBef>
+                <a:spcPts val="500"/>
+              </a:spcBef>
+              <a:buFont typeface="Arial" panose="020B0604020202020204" pitchFamily="34" charset="0"/>
+              <a:buChar char="•"/>
+              <a:defRPr sz="1800" kern="1200">
+                <a:solidFill>
+                  <a:schemeClr val="tx1"/>
+                </a:solidFill>
+                <a:latin typeface="+mn-lt"/>
+                <a:ea typeface="+mn-ea"/>
+                <a:cs typeface="+mn-cs"/>
+              </a:defRPr>
+            </a:lvl7pPr>
+            <a:lvl8pPr marL="3429000" indent="-228600" algn="l" defTabSz="914400" rtl="0" eaLnBrk="1" latinLnBrk="1" hangingPunct="1">
+              <a:lnSpc>
+                <a:spcPct val="90000"/>
+              </a:lnSpc>
+              <a:spcBef>
+                <a:spcPts val="500"/>
+              </a:spcBef>
+              <a:buFont typeface="Arial" panose="020B0604020202020204" pitchFamily="34" charset="0"/>
+              <a:buChar char="•"/>
+              <a:defRPr sz="1800" kern="1200">
+                <a:solidFill>
+                  <a:schemeClr val="tx1"/>
+                </a:solidFill>
+                <a:latin typeface="+mn-lt"/>
+                <a:ea typeface="+mn-ea"/>
+                <a:cs typeface="+mn-cs"/>
+              </a:defRPr>
+            </a:lvl8pPr>
+            <a:lvl9pPr marL="3886200" indent="-228600" algn="l" defTabSz="914400" rtl="0" eaLnBrk="1" latinLnBrk="1" hangingPunct="1">
+              <a:lnSpc>
+                <a:spcPct val="90000"/>
+              </a:lnSpc>
+              <a:spcBef>
+                <a:spcPts val="500"/>
+              </a:spcBef>
+              <a:buFont typeface="Arial" panose="020B0604020202020204" pitchFamily="34" charset="0"/>
+              <a:buChar char="•"/>
+              <a:defRPr sz="1800" kern="1200">
+                <a:solidFill>
+                  <a:schemeClr val="tx1"/>
+                </a:solidFill>
+                <a:latin typeface="+mn-lt"/>
+                <a:ea typeface="+mn-ea"/>
+                <a:cs typeface="+mn-cs"/>
+              </a:defRPr>
+            </a:lvl9pPr>
+          </a:lstStyle>
+          <a:p>
+            <a:pPr marL="0" indent="0">
+              <a:buNone/>
+            </a:pPr>
+            <a:r>
+              <a:rPr lang="en" altLang="ko-KR" dirty="0" err="1"/>
+              <a:t>int</a:t>
+            </a:r>
+            <a:r>
+              <a:rPr lang="en" altLang="ko-KR" dirty="0"/>
+              <a:t> </a:t>
+            </a:r>
+            <a:r>
+              <a:rPr lang="en" altLang="ko-KR" dirty="0" err="1"/>
+              <a:t>get_ok_char</a:t>
+            </a:r>
+            <a:r>
+              <a:rPr lang="en" altLang="ko-KR" dirty="0"/>
+              <a:t>(){</a:t>
+            </a:r>
+          </a:p>
+          <a:p>
+            <a:pPr marL="0" indent="0">
+              <a:buNone/>
+            </a:pPr>
+            <a:r>
+              <a:rPr lang="en" altLang="ko-KR" dirty="0"/>
+              <a:t>    </a:t>
+            </a:r>
+            <a:r>
+              <a:rPr lang="en" altLang="ko-KR" dirty="0" err="1"/>
+              <a:t>int</a:t>
+            </a:r>
+            <a:r>
+              <a:rPr lang="en" altLang="ko-KR" dirty="0"/>
+              <a:t> c;</a:t>
+            </a:r>
+          </a:p>
+          <a:p>
+            <a:pPr marL="0" indent="0">
+              <a:buNone/>
+            </a:pPr>
+            <a:r>
+              <a:rPr lang="en" altLang="ko-KR" dirty="0"/>
+              <a:t>    while((c=</a:t>
+            </a:r>
+            <a:r>
+              <a:rPr lang="en" altLang="ko-KR" dirty="0" err="1"/>
+              <a:t>getchar</a:t>
+            </a:r>
+            <a:r>
+              <a:rPr lang="en" altLang="ko-KR" dirty="0"/>
+              <a:t>())!=EOF&amp;&amp;</a:t>
+            </a:r>
+            <a:r>
+              <a:rPr lang="en" altLang="ko-KR" dirty="0" err="1"/>
+              <a:t>strchr</a:t>
+            </a:r>
+            <a:r>
+              <a:rPr lang="en" altLang="ko-KR" dirty="0"/>
+              <a:t>(</a:t>
+            </a:r>
+            <a:r>
+              <a:rPr lang="en" altLang="ko-KR" dirty="0" err="1"/>
+              <a:t>commandstring,c</a:t>
+            </a:r>
+            <a:r>
+              <a:rPr lang="en" altLang="ko-KR" dirty="0"/>
+              <a:t>)==NULL);</a:t>
+            </a:r>
+          </a:p>
+          <a:p>
+            <a:pPr marL="0" indent="0">
+              <a:buNone/>
+            </a:pPr>
+            <a:r>
+              <a:rPr lang="en" altLang="ko-KR" dirty="0"/>
+              <a:t>    return c;</a:t>
+            </a:r>
+          </a:p>
+          <a:p>
+            <a:pPr marL="0" indent="0">
+              <a:buNone/>
+            </a:pPr>
+            <a:r>
+              <a:rPr lang="en" altLang="ko-KR" dirty="0"/>
+              <a:t>}</a:t>
+            </a:r>
+            <a:r>
+              <a:rPr lang="en-US" altLang="ko-KR" dirty="0"/>
+              <a:t>//</a:t>
+            </a:r>
+            <a:r>
+              <a:rPr lang="ko-KR" altLang="en-US" dirty="0"/>
+              <a:t>키보드로 </a:t>
+            </a:r>
+            <a:r>
+              <a:rPr lang="ko-KR" altLang="en-US" dirty="0" err="1"/>
+              <a:t>입력받는</a:t>
+            </a:r>
+            <a:r>
+              <a:rPr lang="ko-KR" altLang="en-US" dirty="0"/>
+              <a:t> 함수 </a:t>
+            </a:r>
+            <a:r>
+              <a:rPr lang="en-US" altLang="ko-KR" dirty="0" err="1"/>
+              <a:t>commandstring</a:t>
+            </a:r>
+            <a:r>
+              <a:rPr lang="en-US" altLang="ko-KR" dirty="0"/>
+              <a:t>=</a:t>
+            </a:r>
+            <a:r>
+              <a:rPr lang="ko-KR" altLang="en-US" dirty="0" err="1"/>
+              <a:t>입력될수있는</a:t>
+            </a:r>
+            <a:r>
+              <a:rPr lang="ko-KR" altLang="en-US" dirty="0"/>
+              <a:t> 버튼</a:t>
+            </a:r>
+            <a:r>
+              <a:rPr lang="en-US" altLang="ko-KR" dirty="0"/>
+              <a:t>(char)</a:t>
+            </a:r>
+            <a:r>
+              <a:rPr lang="ko-KR" altLang="en-US" dirty="0"/>
+              <a:t>들의 집합</a:t>
+            </a:r>
+            <a:endParaRPr lang="en" altLang="ko-KR" dirty="0"/>
+          </a:p>
+          <a:p>
+            <a:pPr marL="0" indent="0">
+              <a:buFont typeface="Arial" panose="020B0604020202020204" pitchFamily="34" charset="0"/>
+              <a:buNone/>
+            </a:pPr>
+            <a:endParaRPr kumimoji="1" lang="ko-KR" altLang="en-US" dirty="0"/>
+          </a:p>
+        </p:txBody>
+      </p:sp>
+    </p:spTree>
+    <p:extLst>
+      <p:ext uri="{BB962C8B-B14F-4D97-AF65-F5344CB8AC3E}">
+        <p14:creationId xmlns:p14="http://schemas.microsoft.com/office/powerpoint/2010/main" val="1234200773"/>
+      </p:ext>
+    </p:extLst>
+  </p:cSld>
+  <p:clrMapOvr>
+    <a:masterClrMapping/>
+  </p:clrMapOvr>
+</p:sld>
+</file>
+
+<file path=ppt/slides/slide4.xml><?xml version="1.0" encoding="utf-8"?>
+<p:sld xmlns:a="http://schemas.openxmlformats.org/drawingml/2006/main" xmlns:r="http://schemas.openxmlformats.org/officeDocument/2006/relationships" xmlns:p="http://schemas.openxmlformats.org/presentationml/2006/main">
+  <p:cSld>
+    <p:spTree>
+      <p:nvGrpSpPr>
+        <p:cNvPr id="1" name=""/>
+        <p:cNvGrpSpPr/>
+        <p:nvPr/>
+      </p:nvGrpSpPr>
+      <p:grpSpPr>
+        <a:xfrm>
+          <a:off x="0" y="0"/>
+          <a:ext cx="0" cy="0"/>
+          <a:chOff x="0" y="0"/>
+          <a:chExt cx="0" cy="0"/>
+        </a:xfrm>
+      </p:grpSpPr>
+      <p:sp>
+        <p:nvSpPr>
+          <p:cNvPr id="2" name="제목 1">
+            <a:extLst>
+              <a:ext uri="{FF2B5EF4-FFF2-40B4-BE49-F238E27FC236}">
+                <a16:creationId xmlns:a16="http://schemas.microsoft.com/office/drawing/2014/main" id="{6A380FD0-62DD-7444-AA23-424C17B5CD20}"/>
+              </a:ext>
+            </a:extLst>
+          </p:cNvPr>
+          <p:cNvSpPr>
+            <a:spLocks noGrp="1"/>
+          </p:cNvSpPr>
+          <p:nvPr>
+            <p:ph type="title"/>
+          </p:nvPr>
+        </p:nvSpPr>
+        <p:spPr/>
+        <p:txBody>
+          <a:bodyPr/>
+          <a:lstStyle/>
+          <a:p>
+            <a:r>
+              <a:rPr kumimoji="1" lang="en-US" altLang="ko-KR" dirty="0"/>
+              <a:t>Basic code(</a:t>
+            </a:r>
+            <a:r>
+              <a:rPr kumimoji="1" lang="en-US" altLang="ko-KR" dirty="0" err="1"/>
+              <a:t>main.c</a:t>
+            </a:r>
+            <a:r>
+              <a:rPr kumimoji="1" lang="en-US" altLang="ko-KR" dirty="0"/>
+              <a:t>)</a:t>
+            </a:r>
+            <a:endParaRPr kumimoji="1" lang="ko-KR" altLang="en-US" dirty="0"/>
+          </a:p>
+        </p:txBody>
+      </p:sp>
+      <p:sp>
+        <p:nvSpPr>
+          <p:cNvPr id="3" name="내용 개체 틀 2">
+            <a:extLst>
+              <a:ext uri="{FF2B5EF4-FFF2-40B4-BE49-F238E27FC236}">
+                <a16:creationId xmlns:a16="http://schemas.microsoft.com/office/drawing/2014/main" id="{A269E1F8-36E7-E649-96AB-6D27B9DF4CC8}"/>
+              </a:ext>
+            </a:extLst>
+          </p:cNvPr>
+          <p:cNvSpPr>
+            <a:spLocks noGrp="1"/>
+          </p:cNvSpPr>
+          <p:nvPr>
+            <p:ph idx="1"/>
+          </p:nvPr>
+        </p:nvSpPr>
+        <p:spPr>
+          <a:xfrm>
+            <a:off x="838198" y="1407695"/>
+            <a:ext cx="11012907" cy="5197642"/>
+          </a:xfrm>
+        </p:spPr>
+        <p:txBody>
+          <a:bodyPr numCol="2" spcCol="540000">
+            <a:normAutofit fontScale="92500" lnSpcReduction="20000"/>
+          </a:bodyPr>
+          <a:lstStyle/>
+          <a:p>
+            <a:pPr marL="0" indent="0">
+              <a:buNone/>
+            </a:pPr>
+            <a:r>
+              <a:rPr lang="en" altLang="ko-KR" sz="1700" dirty="0" err="1"/>
+              <a:t>int</a:t>
+            </a:r>
+            <a:r>
+              <a:rPr lang="en" altLang="ko-KR" sz="1700" dirty="0"/>
+              <a:t> main(void){</a:t>
+            </a:r>
+          </a:p>
+          <a:p>
+            <a:pPr marL="0" indent="0">
+              <a:buNone/>
+            </a:pPr>
+            <a:r>
+              <a:rPr lang="en" altLang="ko-KR" sz="1700" dirty="0"/>
+              <a:t>    </a:t>
+            </a:r>
+            <a:r>
+              <a:rPr lang="en" altLang="ko-KR" sz="1700" dirty="0" err="1"/>
+              <a:t>initscr</a:t>
+            </a:r>
+            <a:r>
+              <a:rPr lang="en" altLang="ko-KR" sz="1700" dirty="0"/>
+              <a:t>();</a:t>
+            </a:r>
+          </a:p>
+          <a:p>
+            <a:pPr marL="0" indent="0">
+              <a:buNone/>
+            </a:pPr>
+            <a:r>
+              <a:rPr lang="en" altLang="ko-KR" sz="1700" dirty="0"/>
+              <a:t>    </a:t>
+            </a:r>
+            <a:r>
+              <a:rPr lang="en" altLang="ko-KR" sz="1700" dirty="0" err="1"/>
+              <a:t>init_keyboard</a:t>
+            </a:r>
+            <a:r>
+              <a:rPr lang="en" altLang="ko-KR" sz="1700" dirty="0"/>
+              <a:t>();</a:t>
+            </a:r>
+          </a:p>
+          <a:p>
+            <a:pPr marL="0" indent="0">
+              <a:buNone/>
+            </a:pPr>
+            <a:r>
+              <a:rPr lang="en" altLang="ko-KR" sz="1700" dirty="0"/>
+              <a:t>    </a:t>
+            </a:r>
+            <a:r>
+              <a:rPr lang="en" altLang="ko-KR" sz="1700" dirty="0" err="1"/>
+              <a:t>set_nodelay_mode</a:t>
+            </a:r>
+            <a:r>
+              <a:rPr lang="en" altLang="ko-KR" sz="1700" dirty="0"/>
+              <a:t>();</a:t>
+            </a:r>
+          </a:p>
+          <a:p>
+            <a:pPr marL="0" indent="0">
+              <a:buNone/>
+            </a:pPr>
+            <a:endParaRPr lang="en" altLang="ko-KR" sz="1700" dirty="0"/>
+          </a:p>
+          <a:p>
+            <a:pPr marL="0" indent="0">
+              <a:buNone/>
+            </a:pPr>
+            <a:r>
+              <a:rPr lang="en" altLang="ko-KR" sz="1700" dirty="0"/>
+              <a:t>    while(1){</a:t>
+            </a:r>
+          </a:p>
+          <a:p>
+            <a:pPr marL="0" indent="0">
+              <a:buNone/>
+            </a:pPr>
+            <a:r>
+              <a:rPr lang="en" altLang="ko-KR" sz="1700" dirty="0"/>
+              <a:t>        while(1){</a:t>
+            </a:r>
+          </a:p>
+          <a:p>
+            <a:pPr marL="0" indent="0">
+              <a:buNone/>
+            </a:pPr>
+            <a:r>
+              <a:rPr lang="en" altLang="ko-KR" sz="1700" dirty="0"/>
+              <a:t>            if((command=</a:t>
+            </a:r>
+            <a:r>
+              <a:rPr lang="en" altLang="ko-KR" sz="1700" dirty="0" err="1"/>
+              <a:t>get_ok_char</a:t>
+            </a:r>
+            <a:r>
+              <a:rPr lang="en" altLang="ko-KR" sz="1700" dirty="0"/>
+              <a:t>())!=EOF){</a:t>
+            </a:r>
+          </a:p>
+          <a:p>
+            <a:pPr marL="0" indent="0">
+              <a:buNone/>
+            </a:pPr>
+            <a:r>
+              <a:rPr lang="en" altLang="ko-KR" sz="1700" dirty="0"/>
+              <a:t>                if(command==‘q')</a:t>
+            </a:r>
+          </a:p>
+          <a:p>
+            <a:pPr marL="0" indent="0">
+              <a:buNone/>
+            </a:pPr>
+            <a:r>
+              <a:rPr lang="en" altLang="ko-KR" sz="1700" dirty="0"/>
+              <a:t>                    break;</a:t>
+            </a:r>
+          </a:p>
+          <a:p>
+            <a:pPr marL="0" indent="0">
+              <a:buNone/>
+            </a:pPr>
+            <a:r>
+              <a:rPr lang="en" altLang="ko-KR" sz="1700" dirty="0"/>
+              <a:t>	    </a:t>
+            </a:r>
+            <a:r>
+              <a:rPr lang="en" altLang="ko-KR" sz="1700" dirty="0" err="1"/>
+              <a:t>command_function</a:t>
+            </a:r>
+            <a:r>
+              <a:rPr lang="en" altLang="ko-KR" sz="1700" dirty="0"/>
+              <a:t>();</a:t>
+            </a:r>
+          </a:p>
+          <a:p>
+            <a:pPr marL="0" indent="0">
+              <a:buNone/>
+            </a:pPr>
+            <a:r>
+              <a:rPr lang="en" altLang="ko-KR" sz="1700" dirty="0"/>
+              <a:t>                }</a:t>
+            </a:r>
+          </a:p>
+          <a:p>
+            <a:pPr marL="0" indent="0">
+              <a:buNone/>
+            </a:pPr>
+            <a:r>
+              <a:rPr lang="en" altLang="ko-KR" sz="1700" dirty="0"/>
+              <a:t>	process_function1(); </a:t>
+            </a:r>
+          </a:p>
+          <a:p>
+            <a:pPr marL="0" indent="0">
+              <a:buNone/>
+            </a:pPr>
+            <a:r>
+              <a:rPr lang="en" altLang="ko-KR" sz="1700" dirty="0"/>
+              <a:t>        }</a:t>
+            </a:r>
+          </a:p>
+          <a:p>
+            <a:pPr marL="0" indent="0">
+              <a:buNone/>
+            </a:pPr>
+            <a:r>
+              <a:rPr lang="en" altLang="ko-KR" sz="1700" dirty="0"/>
+              <a:t>     process_function2();        </a:t>
+            </a:r>
+          </a:p>
+          <a:p>
+            <a:pPr marL="0" indent="0">
+              <a:buNone/>
+            </a:pPr>
+            <a:r>
+              <a:rPr lang="ko-KR" altLang="en-US" sz="1700" dirty="0"/>
+              <a:t>    </a:t>
+            </a:r>
+            <a:r>
+              <a:rPr lang="en" altLang="ko-KR" sz="1700" dirty="0"/>
+              <a:t>while(1){</a:t>
+            </a:r>
+          </a:p>
+          <a:p>
+            <a:pPr marL="0" indent="0">
+              <a:buNone/>
+            </a:pPr>
+            <a:r>
+              <a:rPr lang="en" altLang="ko-KR" sz="1700" dirty="0"/>
+              <a:t>            if((command=</a:t>
+            </a:r>
+            <a:r>
+              <a:rPr lang="en" altLang="ko-KR" sz="1700" dirty="0" err="1"/>
+              <a:t>get_ok_char</a:t>
+            </a:r>
+            <a:r>
+              <a:rPr lang="en" altLang="ko-KR" sz="1700" dirty="0"/>
+              <a:t>())!=EOF){</a:t>
+            </a:r>
+          </a:p>
+          <a:p>
+            <a:pPr marL="0" indent="0">
+              <a:buNone/>
+            </a:pPr>
+            <a:r>
+              <a:rPr lang="en" altLang="ko-KR" sz="1700" dirty="0"/>
+              <a:t>                if(command==</a:t>
+            </a:r>
+            <a:r>
+              <a:rPr lang="en-US" altLang="ko-KR" sz="1700" dirty="0"/>
+              <a:t>’q</a:t>
+            </a:r>
+            <a:r>
+              <a:rPr lang="en" altLang="ko-KR" sz="1700" dirty="0"/>
+              <a:t>')</a:t>
+            </a:r>
+          </a:p>
+          <a:p>
+            <a:pPr marL="0" indent="0">
+              <a:buNone/>
+            </a:pPr>
+            <a:r>
+              <a:rPr lang="en" altLang="ko-KR" sz="1700" dirty="0"/>
+              <a:t>                    break;</a:t>
+            </a:r>
+          </a:p>
+          <a:p>
+            <a:pPr marL="0" indent="0">
+              <a:buNone/>
+            </a:pPr>
+            <a:r>
+              <a:rPr lang="en" altLang="ko-KR" sz="1700" dirty="0"/>
+              <a:t>	    </a:t>
+            </a:r>
+            <a:r>
+              <a:rPr lang="en" altLang="ko-KR" sz="1700" dirty="0" err="1"/>
+              <a:t>command_function</a:t>
+            </a:r>
+            <a:r>
+              <a:rPr lang="en" altLang="ko-KR" sz="1700" dirty="0"/>
+              <a:t>(command);</a:t>
+            </a:r>
+          </a:p>
+          <a:p>
+            <a:pPr marL="0" indent="0">
+              <a:buNone/>
+            </a:pPr>
+            <a:r>
+              <a:rPr lang="en" altLang="ko-KR" sz="1700" dirty="0"/>
+              <a:t>            }</a:t>
+            </a:r>
+          </a:p>
+          <a:p>
+            <a:pPr marL="0" indent="0">
+              <a:buNone/>
+            </a:pPr>
+            <a:r>
+              <a:rPr lang="en" altLang="ko-KR" sz="1700" dirty="0"/>
+              <a:t>	process_function3(); </a:t>
+            </a:r>
+          </a:p>
+          <a:p>
+            <a:pPr marL="0" indent="0">
+              <a:buNone/>
+            </a:pPr>
+            <a:r>
+              <a:rPr lang="en" altLang="ko-KR" sz="1700" dirty="0"/>
+              <a:t>        }</a:t>
+            </a:r>
+          </a:p>
+          <a:p>
+            <a:pPr marL="0" indent="0">
+              <a:buNone/>
+            </a:pPr>
+            <a:r>
+              <a:rPr lang="en" altLang="ko-KR" sz="1700" dirty="0"/>
+              <a:t>    }</a:t>
+            </a:r>
+          </a:p>
+          <a:p>
+            <a:pPr marL="0" indent="0">
+              <a:buNone/>
+            </a:pPr>
+            <a:r>
+              <a:rPr lang="en" altLang="ko-KR" sz="1700" dirty="0"/>
+              <a:t>    process_function4();</a:t>
+            </a:r>
+          </a:p>
+          <a:p>
+            <a:pPr marL="0" indent="0">
+              <a:buNone/>
+            </a:pPr>
+            <a:r>
+              <a:rPr lang="en" altLang="ko-KR" sz="1700" dirty="0"/>
+              <a:t>…</a:t>
+            </a:r>
+          </a:p>
+          <a:p>
+            <a:pPr marL="0" indent="0">
+              <a:buNone/>
+            </a:pPr>
+            <a:r>
+              <a:rPr lang="en" altLang="ko-KR" sz="1700" dirty="0"/>
+              <a:t>…</a:t>
+            </a:r>
+          </a:p>
+          <a:p>
+            <a:pPr marL="0" indent="0">
+              <a:buNone/>
+            </a:pPr>
+            <a:r>
+              <a:rPr lang="en" altLang="ko-KR" sz="1700" dirty="0"/>
+              <a:t>...</a:t>
+            </a:r>
+          </a:p>
+          <a:p>
+            <a:pPr marL="0" indent="0">
+              <a:buNone/>
+            </a:pPr>
+            <a:r>
+              <a:rPr lang="en" altLang="ko-KR" sz="1700" dirty="0"/>
+              <a:t>… </a:t>
+            </a:r>
+          </a:p>
+          <a:p>
+            <a:pPr marL="0" indent="0">
+              <a:buNone/>
+            </a:pPr>
+            <a:r>
+              <a:rPr lang="en" altLang="ko-KR" sz="1700" dirty="0"/>
+              <a:t>… </a:t>
+            </a:r>
+          </a:p>
+          <a:p>
+            <a:pPr marL="0" indent="0">
+              <a:buNone/>
+            </a:pPr>
+            <a:r>
+              <a:rPr lang="en" altLang="ko-KR" sz="1700" dirty="0"/>
+              <a:t>… </a:t>
+            </a:r>
+          </a:p>
+          <a:p>
+            <a:pPr marL="0" indent="0">
+              <a:buNone/>
+            </a:pPr>
+            <a:r>
+              <a:rPr lang="en" altLang="ko-KR" sz="1700" dirty="0"/>
+              <a:t>    </a:t>
+            </a:r>
+            <a:r>
+              <a:rPr lang="en" altLang="ko-KR" sz="1700" dirty="0" err="1"/>
+              <a:t>endwin</a:t>
+            </a:r>
+            <a:r>
+              <a:rPr lang="en" altLang="ko-KR" sz="1700" dirty="0"/>
+              <a:t>();</a:t>
+            </a:r>
+          </a:p>
+          <a:p>
+            <a:pPr marL="0" indent="0">
+              <a:buNone/>
+            </a:pPr>
+            <a:r>
+              <a:rPr lang="en" altLang="ko-KR" sz="1700" dirty="0"/>
+              <a:t>}</a:t>
+            </a:r>
+          </a:p>
+          <a:p>
+            <a:pPr marL="0" indent="0">
+              <a:buNone/>
+            </a:pPr>
+            <a:endParaRPr kumimoji="1" lang="ko-KR" altLang="en-US" sz="1700" dirty="0"/>
+          </a:p>
+        </p:txBody>
+      </p:sp>
+    </p:spTree>
+    <p:extLst>
+      <p:ext uri="{BB962C8B-B14F-4D97-AF65-F5344CB8AC3E}">
+        <p14:creationId xmlns:p14="http://schemas.microsoft.com/office/powerpoint/2010/main" val="2621120042"/>
+      </p:ext>
+    </p:extLst>
+  </p:cSld>
+  <p:clrMapOvr>
+    <a:masterClrMapping/>
+  </p:clrMapOvr>
+</p:sld>
+</file>
+
 <file path=ppt/theme/theme1.xml><?xml version="1.0" encoding="utf-8"?>
 <a:theme xmlns:a="http://schemas.openxmlformats.org/drawingml/2006/main" name="Office 테마">
   <a:themeElements>

</xml_diff>